<commit_message>
Deploying to gh-pages from  @ 76f2ce0585424b3432df1ba4df228e43e5cafb0f 🚀
</commit_message>
<xml_diff>
--- a/assets/img/Kacheln.pptx
+++ b/assets/img/Kacheln.pptx
@@ -3340,8 +3340,8 @@
         </p:nvSpPr>
         <p:spPr>
           <a:xfrm>
-            <a:off x="1001671" y="837670"/>
-            <a:ext cx="2381250" cy="2381250"/>
+            <a:off x="1001671" y="835720"/>
+            <a:ext cx="2381250" cy="2383200"/>
           </a:xfrm>
           <a:prstGeom prst="rect">
             <a:avLst/>
@@ -3357,10 +3357,7 @@
           <a:lstStyle/>
           <a:p>
             <a:pPr algn="ctr"/>
-            <a:r>
-              <a:rPr lang="de-DE" sz="2400" dirty="0"/>
-              <a:t>Gebäude</a:t>
-            </a:r>
+            <a:endParaRPr lang="de-DE" sz="2400" dirty="0"/>
           </a:p>
         </p:txBody>
       </p:sp>
@@ -3378,8 +3375,8 @@
         </p:nvSpPr>
         <p:spPr>
           <a:xfrm>
-            <a:off x="3606008" y="837670"/>
-            <a:ext cx="2381250" cy="2381250"/>
+            <a:off x="3617590" y="835720"/>
+            <a:ext cx="2381250" cy="2383200"/>
           </a:xfrm>
           <a:prstGeom prst="rect">
             <a:avLst/>
@@ -3401,22 +3398,7 @@
             </a:lvl1pPr>
           </a:lstStyle>
           <a:p>
-            <a:r>
-              <a:rPr lang="de-DE" dirty="0"/>
-              <a:t>Steuern</a:t>
-            </a:r>
-          </a:p>
-          <a:p>
-            <a:r>
-              <a:rPr lang="de-DE" dirty="0"/>
-              <a:t>und</a:t>
-            </a:r>
-          </a:p>
-          <a:p>
-            <a:r>
-              <a:rPr lang="de-DE" dirty="0"/>
-              <a:t>Abgaben</a:t>
-            </a:r>
+            <a:endParaRPr lang="de-DE" dirty="0"/>
           </a:p>
         </p:txBody>
       </p:sp>
@@ -3454,10 +3436,7 @@
           <a:lstStyle/>
           <a:p>
             <a:pPr algn="ctr"/>
-            <a:r>
-              <a:rPr lang="de-DE" sz="2400" dirty="0"/>
-              <a:t>Wohnheime und andere Unterkünfte</a:t>
-            </a:r>
+            <a:endParaRPr lang="de-DE" sz="2400" dirty="0"/>
           </a:p>
         </p:txBody>
       </p:sp>
@@ -3475,7 +3454,7 @@
         </p:nvSpPr>
         <p:spPr>
           <a:xfrm>
-            <a:off x="1001671" y="3416675"/>
+            <a:off x="1001671" y="3467279"/>
             <a:ext cx="2381250" cy="2383200"/>
           </a:xfrm>
           <a:prstGeom prst="rect">
@@ -3495,10 +3474,7 @@
           <a:lstStyle/>
           <a:p>
             <a:pPr algn="ctr"/>
-            <a:r>
-              <a:rPr lang="de-DE" sz="2400" dirty="0"/>
-              <a:t>Bauvorhaben</a:t>
-            </a:r>
+            <a:endParaRPr lang="de-DE" sz="2400" dirty="0"/>
           </a:p>
         </p:txBody>
       </p:sp>
@@ -3516,8 +3492,8 @@
         </p:nvSpPr>
         <p:spPr>
           <a:xfrm>
-            <a:off x="3551637" y="3416675"/>
-            <a:ext cx="2489992" cy="2381250"/>
+            <a:off x="3551637" y="3467279"/>
+            <a:ext cx="2489992" cy="2383200"/>
           </a:xfrm>
           <a:prstGeom prst="rect">
             <a:avLst/>
@@ -3533,24 +3509,7 @@
           <a:lstStyle/>
           <a:p>
             <a:pPr algn="ctr"/>
-            <a:r>
-              <a:rPr lang="de-DE" sz="2400" noProof="1"/>
-              <a:t>Tabellen</a:t>
-            </a:r>
-          </a:p>
-          <a:p>
-            <a:pPr algn="ctr"/>
-            <a:r>
-              <a:rPr lang="de-DE" sz="2400" noProof="1"/>
-              <a:t>des</a:t>
-            </a:r>
-          </a:p>
-          <a:p>
-            <a:pPr algn="ctr"/>
-            <a:r>
-              <a:rPr lang="de-DE" sz="2400" noProof="1"/>
-              <a:t>Monats</a:t>
-            </a:r>
+            <a:endParaRPr lang="de-DE" sz="2400" noProof="1"/>
           </a:p>
         </p:txBody>
       </p:sp>
@@ -3568,7 +3527,7 @@
         </p:nvSpPr>
         <p:spPr>
           <a:xfrm>
-            <a:off x="6210345" y="3429897"/>
+            <a:off x="6237530" y="3467279"/>
             <a:ext cx="2381250" cy="2383200"/>
           </a:xfrm>
           <a:prstGeom prst="rect">
@@ -3587,10 +3546,7 @@
           <a:lstStyle/>
           <a:p>
             <a:pPr algn="ctr"/>
-            <a:r>
-              <a:rPr lang="de-DE" sz="2400" dirty="0"/>
-              <a:t>Baukosten</a:t>
-            </a:r>
+            <a:endParaRPr lang="de-DE" sz="2400" dirty="0"/>
           </a:p>
         </p:txBody>
       </p:sp>
@@ -3628,10 +3584,7 @@
           <a:lstStyle/>
           <a:p>
             <a:pPr algn="ctr"/>
-            <a:r>
-              <a:rPr lang="de-DE" sz="2400" dirty="0"/>
-              <a:t>Mieten</a:t>
-            </a:r>
+            <a:endParaRPr lang="de-DE" sz="2400" dirty="0"/>
           </a:p>
         </p:txBody>
       </p:sp>
@@ -3673,6 +3626,216 @@
           </a:p>
         </p:txBody>
       </p:sp>
+      <p:pic>
+        <p:nvPicPr>
+          <p:cNvPr id="2" name="Grafik 1"/>
+          <p:cNvPicPr>
+            <a:picLocks noChangeAspect="1"/>
+          </p:cNvPicPr>
+          <p:nvPr/>
+        </p:nvPicPr>
+        <p:blipFill>
+          <a:blip r:embed="rId2">
+            <a:extLst>
+              <a:ext uri="{28A0092B-C50C-407E-A947-70E740481C1C}">
+                <a14:useLocalDpi xmlns:a14="http://schemas.microsoft.com/office/drawing/2010/main" val="0"/>
+              </a:ext>
+            </a:extLst>
+          </a:blip>
+          <a:stretch>
+            <a:fillRect/>
+          </a:stretch>
+        </p:blipFill>
+        <p:spPr>
+          <a:xfrm>
+            <a:off x="1249055" y="1084079"/>
+            <a:ext cx="1886482" cy="1886482"/>
+          </a:xfrm>
+          <a:prstGeom prst="rect">
+            <a:avLst/>
+          </a:prstGeom>
+        </p:spPr>
+      </p:pic>
+      <p:pic>
+        <p:nvPicPr>
+          <p:cNvPr id="3" name="Grafik 2"/>
+          <p:cNvPicPr>
+            <a:picLocks noChangeAspect="1"/>
+          </p:cNvPicPr>
+          <p:nvPr/>
+        </p:nvPicPr>
+        <p:blipFill>
+          <a:blip r:embed="rId3">
+            <a:extLst>
+              <a:ext uri="{28A0092B-C50C-407E-A947-70E740481C1C}">
+                <a14:useLocalDpi xmlns:a14="http://schemas.microsoft.com/office/drawing/2010/main" val="0"/>
+              </a:ext>
+            </a:extLst>
+          </a:blip>
+          <a:stretch>
+            <a:fillRect/>
+          </a:stretch>
+        </p:blipFill>
+        <p:spPr>
+          <a:xfrm>
+            <a:off x="3853433" y="1084079"/>
+            <a:ext cx="1886400" cy="1886400"/>
+          </a:xfrm>
+          <a:prstGeom prst="rect">
+            <a:avLst/>
+          </a:prstGeom>
+        </p:spPr>
+      </p:pic>
+      <p:pic>
+        <p:nvPicPr>
+          <p:cNvPr id="12" name="Grafik 11"/>
+          <p:cNvPicPr>
+            <a:picLocks noChangeAspect="1"/>
+          </p:cNvPicPr>
+          <p:nvPr/>
+        </p:nvPicPr>
+        <p:blipFill>
+          <a:blip r:embed="rId4">
+            <a:extLst>
+              <a:ext uri="{28A0092B-C50C-407E-A947-70E740481C1C}">
+                <a14:useLocalDpi xmlns:a14="http://schemas.microsoft.com/office/drawing/2010/main" val="0"/>
+              </a:ext>
+            </a:extLst>
+          </a:blip>
+          <a:stretch>
+            <a:fillRect/>
+          </a:stretch>
+        </p:blipFill>
+        <p:spPr>
+          <a:xfrm>
+            <a:off x="6457770" y="1008523"/>
+            <a:ext cx="1886400" cy="1886400"/>
+          </a:xfrm>
+          <a:prstGeom prst="rect">
+            <a:avLst/>
+          </a:prstGeom>
+        </p:spPr>
+      </p:pic>
+      <p:pic>
+        <p:nvPicPr>
+          <p:cNvPr id="13" name="Grafik 12"/>
+          <p:cNvPicPr>
+            <a:picLocks noChangeAspect="1"/>
+          </p:cNvPicPr>
+          <p:nvPr/>
+        </p:nvPicPr>
+        <p:blipFill>
+          <a:blip r:embed="rId5">
+            <a:extLst>
+              <a:ext uri="{28A0092B-C50C-407E-A947-70E740481C1C}">
+                <a14:useLocalDpi xmlns:a14="http://schemas.microsoft.com/office/drawing/2010/main" val="0"/>
+              </a:ext>
+            </a:extLst>
+          </a:blip>
+          <a:stretch>
+            <a:fillRect/>
+          </a:stretch>
+        </p:blipFill>
+        <p:spPr>
+          <a:xfrm>
+            <a:off x="9062107" y="1106613"/>
+            <a:ext cx="1886400" cy="1886400"/>
+          </a:xfrm>
+          <a:prstGeom prst="rect">
+            <a:avLst/>
+          </a:prstGeom>
+        </p:spPr>
+      </p:pic>
+      <p:pic>
+        <p:nvPicPr>
+          <p:cNvPr id="14" name="Grafik 13"/>
+          <p:cNvPicPr>
+            <a:picLocks noChangeAspect="1"/>
+          </p:cNvPicPr>
+          <p:nvPr/>
+        </p:nvPicPr>
+        <p:blipFill>
+          <a:blip r:embed="rId6">
+            <a:extLst>
+              <a:ext uri="{28A0092B-C50C-407E-A947-70E740481C1C}">
+                <a14:useLocalDpi xmlns:a14="http://schemas.microsoft.com/office/drawing/2010/main" val="0"/>
+              </a:ext>
+            </a:extLst>
+          </a:blip>
+          <a:stretch>
+            <a:fillRect/>
+          </a:stretch>
+        </p:blipFill>
+        <p:spPr>
+          <a:xfrm>
+            <a:off x="1249137" y="3678297"/>
+            <a:ext cx="1886400" cy="1886400"/>
+          </a:xfrm>
+          <a:prstGeom prst="rect">
+            <a:avLst/>
+          </a:prstGeom>
+        </p:spPr>
+      </p:pic>
+      <p:pic>
+        <p:nvPicPr>
+          <p:cNvPr id="15" name="Grafik 14"/>
+          <p:cNvPicPr>
+            <a:picLocks noChangeAspect="1"/>
+          </p:cNvPicPr>
+          <p:nvPr/>
+        </p:nvPicPr>
+        <p:blipFill>
+          <a:blip r:embed="rId7">
+            <a:extLst>
+              <a:ext uri="{28A0092B-C50C-407E-A947-70E740481C1C}">
+                <a14:useLocalDpi xmlns:a14="http://schemas.microsoft.com/office/drawing/2010/main" val="0"/>
+              </a:ext>
+            </a:extLst>
+          </a:blip>
+          <a:stretch>
+            <a:fillRect/>
+          </a:stretch>
+        </p:blipFill>
+        <p:spPr>
+          <a:xfrm>
+            <a:off x="3865015" y="3715679"/>
+            <a:ext cx="1886400" cy="1886400"/>
+          </a:xfrm>
+          <a:prstGeom prst="rect">
+            <a:avLst/>
+          </a:prstGeom>
+        </p:spPr>
+      </p:pic>
+      <p:pic>
+        <p:nvPicPr>
+          <p:cNvPr id="16" name="Grafik 15"/>
+          <p:cNvPicPr>
+            <a:picLocks noChangeAspect="1"/>
+          </p:cNvPicPr>
+          <p:nvPr/>
+        </p:nvPicPr>
+        <p:blipFill>
+          <a:blip r:embed="rId8">
+            <a:extLst>
+              <a:ext uri="{28A0092B-C50C-407E-A947-70E740481C1C}">
+                <a14:useLocalDpi xmlns:a14="http://schemas.microsoft.com/office/drawing/2010/main" val="0"/>
+              </a:ext>
+            </a:extLst>
+          </a:blip>
+          <a:stretch>
+            <a:fillRect/>
+          </a:stretch>
+        </p:blipFill>
+        <p:spPr>
+          <a:xfrm>
+            <a:off x="6457770" y="3678297"/>
+            <a:ext cx="1886400" cy="1886400"/>
+          </a:xfrm>
+          <a:prstGeom prst="rect">
+            <a:avLst/>
+          </a:prstGeom>
+        </p:spPr>
+      </p:pic>
     </p:spTree>
     <p:extLst>
       <p:ext uri="{BB962C8B-B14F-4D97-AF65-F5344CB8AC3E}">

</xml_diff>